<commit_message>
completed the member eligibility powerpoint
</commit_message>
<xml_diff>
--- a/PowerPoints/Phase 2 - Overview/002 An Overview of Medical Claims Data.pptx
+++ b/PowerPoints/Phase 2 - Overview/002 An Overview of Medical Claims Data.pptx
@@ -256,7 +256,7 @@
           <a:p>
             <a:fld id="{FF632088-7E42-4B13-8645-6CA4616862AF}" type="datetimeFigureOut">
               <a:rPr lang="en-US" smtClean="0"/>
-              <a:t>2/23/2016</a:t>
+              <a:t>2/29/2016</a:t>
             </a:fld>
             <a:endParaRPr lang="en-US"/>
           </a:p>
@@ -426,7 +426,7 @@
           <a:p>
             <a:fld id="{FF632088-7E42-4B13-8645-6CA4616862AF}" type="datetimeFigureOut">
               <a:rPr lang="en-US" smtClean="0"/>
-              <a:t>2/23/2016</a:t>
+              <a:t>2/29/2016</a:t>
             </a:fld>
             <a:endParaRPr lang="en-US"/>
           </a:p>
@@ -606,7 +606,7 @@
           <a:p>
             <a:fld id="{FF632088-7E42-4B13-8645-6CA4616862AF}" type="datetimeFigureOut">
               <a:rPr lang="en-US" smtClean="0"/>
-              <a:t>2/23/2016</a:t>
+              <a:t>2/29/2016</a:t>
             </a:fld>
             <a:endParaRPr lang="en-US"/>
           </a:p>
@@ -806,7 +806,7 @@
           <a:p>
             <a:fld id="{FF632088-7E42-4B13-8645-6CA4616862AF}" type="datetimeFigureOut">
               <a:rPr lang="en-US" smtClean="0"/>
-              <a:t>2/23/2016</a:t>
+              <a:t>2/29/2016</a:t>
             </a:fld>
             <a:endParaRPr lang="en-US"/>
           </a:p>
@@ -1023,7 +1023,7 @@
           <a:p>
             <a:fld id="{FF632088-7E42-4B13-8645-6CA4616862AF}" type="datetimeFigureOut">
               <a:rPr lang="en-US" smtClean="0"/>
-              <a:t>2/23/2016</a:t>
+              <a:t>2/29/2016</a:t>
             </a:fld>
             <a:endParaRPr lang="en-US"/>
           </a:p>
@@ -1308,7 +1308,7 @@
           <a:p>
             <a:fld id="{FF632088-7E42-4B13-8645-6CA4616862AF}" type="datetimeFigureOut">
               <a:rPr lang="en-US" smtClean="0"/>
-              <a:t>2/23/2016</a:t>
+              <a:t>2/29/2016</a:t>
             </a:fld>
             <a:endParaRPr lang="en-US"/>
           </a:p>
@@ -1582,7 +1582,7 @@
           <a:p>
             <a:fld id="{FF632088-7E42-4B13-8645-6CA4616862AF}" type="datetimeFigureOut">
               <a:rPr lang="en-US" smtClean="0"/>
-              <a:t>2/23/2016</a:t>
+              <a:t>2/29/2016</a:t>
             </a:fld>
             <a:endParaRPr lang="en-US"/>
           </a:p>
@@ -1679,7 +1679,7 @@
   </p:clrMapOvr>
   <p:extLst>
     <p:ext uri="{DCECCB84-F9BA-43D5-87BE-67443E8EF086}">
-      <p15:sldGuideLst xmlns="" xmlns:p15="http://schemas.microsoft.com/office/powerpoint/2012/main"/>
+      <p15:sldGuideLst xmlns:p15="http://schemas.microsoft.com/office/powerpoint/2012/main" xmlns=""/>
     </p:ext>
   </p:extLst>
 </p:sldLayout>
@@ -2009,7 +2009,7 @@
           <a:p>
             <a:fld id="{FF632088-7E42-4B13-8645-6CA4616862AF}" type="datetimeFigureOut">
               <a:rPr lang="en-US" smtClean="0"/>
-              <a:t>2/23/2016</a:t>
+              <a:t>2/29/2016</a:t>
             </a:fld>
             <a:endParaRPr lang="en-US"/>
           </a:p>
@@ -2106,7 +2106,7 @@
   </p:clrMapOvr>
   <p:extLst>
     <p:ext uri="{DCECCB84-F9BA-43D5-87BE-67443E8EF086}">
-      <p15:sldGuideLst xmlns="" xmlns:p15="http://schemas.microsoft.com/office/powerpoint/2012/main"/>
+      <p15:sldGuideLst xmlns:p15="http://schemas.microsoft.com/office/powerpoint/2012/main" xmlns=""/>
     </p:ext>
   </p:extLst>
 </p:sldLayout>
@@ -2169,7 +2169,7 @@
           <a:p>
             <a:fld id="{FF632088-7E42-4B13-8645-6CA4616862AF}" type="datetimeFigureOut">
               <a:rPr lang="en-US" smtClean="0"/>
-              <a:t>2/23/2016</a:t>
+              <a:t>2/29/2016</a:t>
             </a:fld>
             <a:endParaRPr lang="en-US"/>
           </a:p>
@@ -2301,7 +2301,7 @@
           <a:p>
             <a:fld id="{FF632088-7E42-4B13-8645-6CA4616862AF}" type="datetimeFigureOut">
               <a:rPr lang="en-US" smtClean="0"/>
-              <a:t>2/23/2016</a:t>
+              <a:t>2/29/2016</a:t>
             </a:fld>
             <a:endParaRPr lang="en-US"/>
           </a:p>
@@ -2552,7 +2552,7 @@
           <a:p>
             <a:fld id="{FF632088-7E42-4B13-8645-6CA4616862AF}" type="datetimeFigureOut">
               <a:rPr lang="en-US" smtClean="0"/>
-              <a:t>2/23/2016</a:t>
+              <a:t>2/29/2016</a:t>
             </a:fld>
             <a:endParaRPr lang="en-US"/>
           </a:p>
@@ -2649,7 +2649,7 @@
   </p:clrMapOvr>
   <p:extLst>
     <p:ext uri="{DCECCB84-F9BA-43D5-87BE-67443E8EF086}">
-      <p15:sldGuideLst xmlns="" xmlns:p15="http://schemas.microsoft.com/office/powerpoint/2012/main"/>
+      <p15:sldGuideLst xmlns:p15="http://schemas.microsoft.com/office/powerpoint/2012/main" xmlns=""/>
     </p:ext>
   </p:extLst>
 </p:sldLayout>
@@ -2764,7 +2764,7 @@
           <a:p>
             <a:fld id="{FF632088-7E42-4B13-8645-6CA4616862AF}" type="datetimeFigureOut">
               <a:rPr lang="en-US" smtClean="0"/>
-              <a:t>2/23/2016</a:t>
+              <a:t>2/29/2016</a:t>
             </a:fld>
             <a:endParaRPr lang="en-US"/>
           </a:p>
@@ -3182,7 +3182,7 @@
           <a:p>
             <a:fld id="{FF632088-7E42-4B13-8645-6CA4616862AF}" type="datetimeFigureOut">
               <a:rPr lang="en-US" smtClean="0"/>
-              <a:t>2/23/2016</a:t>
+              <a:t>2/29/2016</a:t>
             </a:fld>
             <a:endParaRPr lang="en-US"/>
           </a:p>
@@ -3394,7 +3394,7 @@
           <a:p>
             <a:fld id="{FF632088-7E42-4B13-8645-6CA4616862AF}" type="datetimeFigureOut">
               <a:rPr lang="en-US" smtClean="0"/>
-              <a:t>2/23/2016</a:t>
+              <a:t>2/29/2016</a:t>
             </a:fld>
             <a:endParaRPr lang="en-US"/>
           </a:p>
@@ -3615,7 +3615,7 @@
           <a:p>
             <a:fld id="{FF632088-7E42-4B13-8645-6CA4616862AF}" type="datetimeFigureOut">
               <a:rPr lang="en-US" smtClean="0"/>
-              <a:t>2/23/2016</a:t>
+              <a:t>2/29/2016</a:t>
             </a:fld>
             <a:endParaRPr lang="en-US"/>
           </a:p>
@@ -3903,7 +3903,7 @@
           <a:p>
             <a:fld id="{FF632088-7E42-4B13-8645-6CA4616862AF}" type="datetimeFigureOut">
               <a:rPr lang="en-US" smtClean="0"/>
-              <a:t>2/23/2016</a:t>
+              <a:t>2/29/2016</a:t>
             </a:fld>
             <a:endParaRPr lang="en-US"/>
           </a:p>
@@ -4135,7 +4135,7 @@
           <a:p>
             <a:fld id="{FF632088-7E42-4B13-8645-6CA4616862AF}" type="datetimeFigureOut">
               <a:rPr lang="en-US" smtClean="0"/>
-              <a:t>2/23/2016</a:t>
+              <a:t>2/29/2016</a:t>
             </a:fld>
             <a:endParaRPr lang="en-US"/>
           </a:p>
@@ -4195,7 +4195,7 @@
   </p:clrMapOvr>
   <p:extLst>
     <p:ext uri="{DCECCB84-F9BA-43D5-87BE-67443E8EF086}">
-      <p15:sldGuideLst xmlns="" xmlns:p15="http://schemas.microsoft.com/office/powerpoint/2012/main"/>
+      <p15:sldGuideLst xmlns:p15="http://schemas.microsoft.com/office/powerpoint/2012/main" xmlns=""/>
     </p:ext>
   </p:extLst>
 </p:sldLayout>
@@ -4487,7 +4487,7 @@
           <a:p>
             <a:fld id="{FF632088-7E42-4B13-8645-6CA4616862AF}" type="datetimeFigureOut">
               <a:rPr lang="en-US" smtClean="0"/>
-              <a:t>2/23/2016</a:t>
+              <a:t>2/29/2016</a:t>
             </a:fld>
             <a:endParaRPr lang="en-US"/>
           </a:p>
@@ -4570,7 +4570,7 @@
   </p:clrMapOvr>
   <p:extLst>
     <p:ext uri="{DCECCB84-F9BA-43D5-87BE-67443E8EF086}">
-      <p15:sldGuideLst xmlns="" xmlns:p15="http://schemas.microsoft.com/office/powerpoint/2012/main"/>
+      <p15:sldGuideLst xmlns:p15="http://schemas.microsoft.com/office/powerpoint/2012/main" xmlns=""/>
     </p:ext>
   </p:extLst>
 </p:sldLayout>
@@ -4610,7 +4610,7 @@
           <a:p>
             <a:fld id="{FF632088-7E42-4B13-8645-6CA4616862AF}" type="datetimeFigureOut">
               <a:rPr lang="en-US" smtClean="0"/>
-              <a:t>2/23/2016</a:t>
+              <a:t>2/29/2016</a:t>
             </a:fld>
             <a:endParaRPr lang="en-US"/>
           </a:p>
@@ -4728,7 +4728,7 @@
           <a:p>
             <a:fld id="{FF632088-7E42-4B13-8645-6CA4616862AF}" type="datetimeFigureOut">
               <a:rPr lang="en-US" smtClean="0"/>
-              <a:t>2/23/2016</a:t>
+              <a:t>2/29/2016</a:t>
             </a:fld>
             <a:endParaRPr lang="en-US"/>
           </a:p>
@@ -5012,7 +5012,7 @@
           <a:p>
             <a:fld id="{FF632088-7E42-4B13-8645-6CA4616862AF}" type="datetimeFigureOut">
               <a:rPr lang="en-US" smtClean="0"/>
-              <a:t>2/23/2016</a:t>
+              <a:t>2/29/2016</a:t>
             </a:fld>
             <a:endParaRPr lang="en-US"/>
           </a:p>
@@ -5072,7 +5072,7 @@
   </p:clrMapOvr>
   <p:extLst>
     <p:ext uri="{DCECCB84-F9BA-43D5-87BE-67443E8EF086}">
-      <p15:sldGuideLst xmlns="" xmlns:p15="http://schemas.microsoft.com/office/powerpoint/2012/main"/>
+      <p15:sldGuideLst xmlns:p15="http://schemas.microsoft.com/office/powerpoint/2012/main" xmlns=""/>
     </p:ext>
   </p:extLst>
 </p:sldLayout>
@@ -5281,7 +5281,7 @@
           <a:p>
             <a:fld id="{FF632088-7E42-4B13-8645-6CA4616862AF}" type="datetimeFigureOut">
               <a:rPr lang="en-US" smtClean="0"/>
-              <a:t>2/23/2016</a:t>
+              <a:t>2/29/2016</a:t>
             </a:fld>
             <a:endParaRPr lang="en-US"/>
           </a:p>
@@ -5495,7 +5495,7 @@
           <a:p>
             <a:fld id="{FF632088-7E42-4B13-8645-6CA4616862AF}" type="datetimeFigureOut">
               <a:rPr lang="en-US" smtClean="0"/>
-              <a:t>2/23/2016</a:t>
+              <a:t>2/29/2016</a:t>
             </a:fld>
             <a:endParaRPr lang="en-US"/>
           </a:p>
@@ -5871,7 +5871,7 @@
   </p:txStyles>
   <p:extLst>
     <p:ext uri="{27BBF7A9-308A-43DC-89C8-2F10F3537804}">
-      <p15:sldGuideLst xmlns="" xmlns:p15="http://schemas.microsoft.com/office/powerpoint/2012/main"/>
+      <p15:sldGuideLst xmlns:p15="http://schemas.microsoft.com/office/powerpoint/2012/main" xmlns=""/>
     </p:ext>
   </p:extLst>
 </p:sldMaster>
@@ -6100,7 +6100,7 @@
           <a:p>
             <a:fld id="{FF632088-7E42-4B13-8645-6CA4616862AF}" type="datetimeFigureOut">
               <a:rPr lang="en-US" smtClean="0"/>
-              <a:t>2/23/2016</a:t>
+              <a:t>2/29/2016</a:t>
             </a:fld>
             <a:endParaRPr lang="en-US"/>
           </a:p>
@@ -6568,7 +6568,7 @@
   </p:txStyles>
   <p:extLst>
     <p:ext uri="{27BBF7A9-308A-43DC-89C8-2F10F3537804}">
-      <p15:sldGuideLst xmlns="" xmlns:p15="http://schemas.microsoft.com/office/powerpoint/2012/main"/>
+      <p15:sldGuideLst xmlns:p15="http://schemas.microsoft.com/office/powerpoint/2012/main" xmlns=""/>
     </p:ext>
   </p:extLst>
 </p:sldMaster>
@@ -7044,6 +7044,21 @@
         <p:txBody>
           <a:bodyPr/>
           <a:lstStyle/>
+          <a:p>
+            <a:r>
+              <a:rPr lang="en-US" dirty="0">
+                <a:hlinkClick r:id="rId2"/>
+              </a:rPr>
+              <a:t>http://</a:t>
+            </a:r>
+            <a:r>
+              <a:rPr lang="en-US" dirty="0" smtClean="0">
+                <a:hlinkClick r:id="rId2"/>
+              </a:rPr>
+              <a:t>www.chiamass.gov/assets/docs/p/apcd/submission-guides/version-5.0/v5-apcd-medical-claim-file-submission-guide-FINAL.pdf</a:t>
+            </a:r>
+            <a:endParaRPr lang="en-US" dirty="0" smtClean="0"/>
+          </a:p>
           <a:p>
             <a:endParaRPr lang="en-US" dirty="0"/>
           </a:p>
@@ -7562,7 +7577,7 @@
   <a:extraClrSchemeLst/>
   <a:extLst>
     <a:ext uri="{05A4C25C-085E-4340-85A3-A5531E510DB2}">
-      <thm15:themeFamily xmlns="" xmlns:thm15="http://schemas.microsoft.com/office/thememl/2012/main" name="Gallery" id="{BBFCD31E-59A1-489D-B089-A3EAD7CAE12E}" vid="{AC464412-510E-4F2B-8947-A0DDBD028997}"/>
+      <thm15:themeFamily xmlns:thm15="http://schemas.microsoft.com/office/thememl/2012/main" xmlns="" name="Gallery" id="{BBFCD31E-59A1-489D-B089-A3EAD7CAE12E}" vid="{AC464412-510E-4F2B-8947-A0DDBD028997}"/>
     </a:ext>
   </a:extLst>
 </a:theme>

</xml_diff>

<commit_message>
worked on the claims powerpoint
</commit_message>
<xml_diff>
--- a/PowerPoints/Phase 2 - Overview/002 An Overview of Medical Claims Data.pptx
+++ b/PowerPoints/Phase 2 - Overview/002 An Overview of Medical Claims Data.pptx
@@ -1679,7 +1679,7 @@
   </p:clrMapOvr>
   <p:extLst>
     <p:ext uri="{DCECCB84-F9BA-43D5-87BE-67443E8EF086}">
-      <p15:sldGuideLst xmlns:p15="http://schemas.microsoft.com/office/powerpoint/2012/main" xmlns=""/>
+      <p15:sldGuideLst xmlns="" xmlns:p15="http://schemas.microsoft.com/office/powerpoint/2012/main"/>
     </p:ext>
   </p:extLst>
 </p:sldLayout>
@@ -2106,7 +2106,7 @@
   </p:clrMapOvr>
   <p:extLst>
     <p:ext uri="{DCECCB84-F9BA-43D5-87BE-67443E8EF086}">
-      <p15:sldGuideLst xmlns:p15="http://schemas.microsoft.com/office/powerpoint/2012/main" xmlns=""/>
+      <p15:sldGuideLst xmlns="" xmlns:p15="http://schemas.microsoft.com/office/powerpoint/2012/main"/>
     </p:ext>
   </p:extLst>
 </p:sldLayout>
@@ -2649,7 +2649,7 @@
   </p:clrMapOvr>
   <p:extLst>
     <p:ext uri="{DCECCB84-F9BA-43D5-87BE-67443E8EF086}">
-      <p15:sldGuideLst xmlns:p15="http://schemas.microsoft.com/office/powerpoint/2012/main" xmlns=""/>
+      <p15:sldGuideLst xmlns="" xmlns:p15="http://schemas.microsoft.com/office/powerpoint/2012/main"/>
     </p:ext>
   </p:extLst>
 </p:sldLayout>
@@ -4195,7 +4195,7 @@
   </p:clrMapOvr>
   <p:extLst>
     <p:ext uri="{DCECCB84-F9BA-43D5-87BE-67443E8EF086}">
-      <p15:sldGuideLst xmlns:p15="http://schemas.microsoft.com/office/powerpoint/2012/main" xmlns=""/>
+      <p15:sldGuideLst xmlns="" xmlns:p15="http://schemas.microsoft.com/office/powerpoint/2012/main"/>
     </p:ext>
   </p:extLst>
 </p:sldLayout>
@@ -4570,7 +4570,7 @@
   </p:clrMapOvr>
   <p:extLst>
     <p:ext uri="{DCECCB84-F9BA-43D5-87BE-67443E8EF086}">
-      <p15:sldGuideLst xmlns:p15="http://schemas.microsoft.com/office/powerpoint/2012/main" xmlns=""/>
+      <p15:sldGuideLst xmlns="" xmlns:p15="http://schemas.microsoft.com/office/powerpoint/2012/main"/>
     </p:ext>
   </p:extLst>
 </p:sldLayout>
@@ -5072,7 +5072,7 @@
   </p:clrMapOvr>
   <p:extLst>
     <p:ext uri="{DCECCB84-F9BA-43D5-87BE-67443E8EF086}">
-      <p15:sldGuideLst xmlns:p15="http://schemas.microsoft.com/office/powerpoint/2012/main" xmlns=""/>
+      <p15:sldGuideLst xmlns="" xmlns:p15="http://schemas.microsoft.com/office/powerpoint/2012/main"/>
     </p:ext>
   </p:extLst>
 </p:sldLayout>
@@ -5871,7 +5871,7 @@
   </p:txStyles>
   <p:extLst>
     <p:ext uri="{27BBF7A9-308A-43DC-89C8-2F10F3537804}">
-      <p15:sldGuideLst xmlns:p15="http://schemas.microsoft.com/office/powerpoint/2012/main" xmlns=""/>
+      <p15:sldGuideLst xmlns="" xmlns:p15="http://schemas.microsoft.com/office/powerpoint/2012/main"/>
     </p:ext>
   </p:extLst>
 </p:sldMaster>
@@ -6568,7 +6568,7 @@
   </p:txStyles>
   <p:extLst>
     <p:ext uri="{27BBF7A9-308A-43DC-89C8-2F10F3537804}">
-      <p15:sldGuideLst xmlns:p15="http://schemas.microsoft.com/office/powerpoint/2012/main" xmlns=""/>
+      <p15:sldGuideLst xmlns="" xmlns:p15="http://schemas.microsoft.com/office/powerpoint/2012/main"/>
     </p:ext>
   </p:extLst>
 </p:sldMaster>
@@ -6682,7 +6682,11 @@
           <a:bodyPr/>
           <a:lstStyle/>
           <a:p>
-            <a:endParaRPr lang="en-US"/>
+            <a:r>
+              <a:rPr lang="en-US" dirty="0" smtClean="0"/>
+              <a:t>What are Medical Claims?</a:t>
+            </a:r>
+            <a:endParaRPr lang="en-US" dirty="0"/>
           </a:p>
         </p:txBody>
       </p:sp>
@@ -6698,8 +6702,69 @@
         </p:nvSpPr>
         <p:spPr/>
         <p:txBody>
-          <a:bodyPr/>
-          <a:lstStyle/>
+          <a:bodyPr>
+            <a:normAutofit/>
+          </a:bodyPr>
+          <a:lstStyle/>
+          <a:p>
+            <a:r>
+              <a:rPr lang="en-US" dirty="0" smtClean="0"/>
+              <a:t>The medical claims data contains both institutional and professional services claims. </a:t>
+            </a:r>
+          </a:p>
+          <a:p>
+            <a:pPr lvl="1"/>
+            <a:r>
+              <a:rPr lang="en-US" dirty="0" smtClean="0"/>
+              <a:t>Examples include </a:t>
+            </a:r>
+            <a:r>
+              <a:rPr lang="en-US" dirty="0" smtClean="0"/>
+              <a:t>hospital inpatient stays, outpatient visits, doctor office </a:t>
+            </a:r>
+            <a:r>
+              <a:rPr lang="en-US" dirty="0" err="1" smtClean="0"/>
+              <a:t>visirt</a:t>
+            </a:r>
+            <a:r>
+              <a:rPr lang="en-US" dirty="0" smtClean="0"/>
+              <a:t>, etc.</a:t>
+            </a:r>
+          </a:p>
+          <a:p>
+            <a:pPr lvl="1"/>
+            <a:r>
+              <a:rPr lang="en-US" dirty="0" smtClean="0"/>
+              <a:t>Dental claims are excluded</a:t>
+            </a:r>
+          </a:p>
+          <a:p>
+            <a:pPr lvl="1"/>
+            <a:r>
+              <a:rPr lang="en-US" dirty="0" smtClean="0"/>
+              <a:t>Prescription drug claims are excluded</a:t>
+            </a:r>
+          </a:p>
+          <a:p>
+            <a:pPr lvl="1"/>
+            <a:r>
+              <a:rPr lang="en-US" dirty="0" smtClean="0"/>
+              <a:t>Fully-denied claims are excluded</a:t>
+            </a:r>
+            <a:endParaRPr lang="en-US" dirty="0" smtClean="0"/>
+          </a:p>
+          <a:p>
+            <a:r>
+              <a:rPr lang="en-US" dirty="0" smtClean="0"/>
+              <a:t>Both fee-for-service and capitated payment claims are included.</a:t>
+            </a:r>
+          </a:p>
+          <a:p>
+            <a:r>
+              <a:rPr lang="en-US" dirty="0" smtClean="0"/>
+              <a:t>Data is recorded at the claim-line level of detail.</a:t>
+            </a:r>
+          </a:p>
           <a:p>
             <a:endParaRPr lang="en-US" dirty="0"/>
           </a:p>
@@ -6750,7 +6815,11 @@
           <a:bodyPr/>
           <a:lstStyle/>
           <a:p>
-            <a:endParaRPr lang="en-US"/>
+            <a:r>
+              <a:rPr lang="en-US" dirty="0" smtClean="0"/>
+              <a:t>Claim Versioning</a:t>
+            </a:r>
+            <a:endParaRPr lang="en-US" dirty="0"/>
           </a:p>
         </p:txBody>
       </p:sp>
@@ -6769,6 +6838,36 @@
           <a:bodyPr/>
           <a:lstStyle/>
           <a:p>
+            <a:r>
+              <a:rPr lang="en-US" dirty="0" smtClean="0"/>
+              <a:t>Claims “re-adjudication” occurs when an insurance company reviews a claim and determines that an incorrect amount was paid.</a:t>
+            </a:r>
+          </a:p>
+          <a:p>
+            <a:r>
+              <a:rPr lang="en-US" dirty="0" smtClean="0"/>
+              <a:t>When a claim is re-adjudicated, the prior paid amounts are zeroed-out and the new amount is entered into the data</a:t>
+            </a:r>
+          </a:p>
+          <a:p>
+            <a:r>
+              <a:rPr lang="en-US" dirty="0" smtClean="0"/>
+              <a:t>This causes the APCD to contain multiple versions of the same claim.</a:t>
+            </a:r>
+          </a:p>
+          <a:p>
+            <a:r>
+              <a:rPr lang="en-US" dirty="0" smtClean="0"/>
+              <a:t>The APCD contains a “Highest Version” indicator field that prevents double counting by identifying the most recent version of a </a:t>
+            </a:r>
+            <a:r>
+              <a:rPr lang="en-US" dirty="0" err="1" smtClean="0"/>
+              <a:t>claimn</a:t>
+            </a:r>
+            <a:r>
+              <a:rPr lang="en-US" dirty="0" smtClean="0"/>
+              <a:t>.</a:t>
+            </a:r>
             <a:endParaRPr lang="en-US" dirty="0"/>
           </a:p>
         </p:txBody>
@@ -6818,7 +6917,11 @@
           <a:bodyPr/>
           <a:lstStyle/>
           <a:p>
-            <a:endParaRPr lang="en-US"/>
+            <a:r>
+              <a:rPr lang="en-US" dirty="0" smtClean="0"/>
+              <a:t>How are Claims Paid</a:t>
+            </a:r>
+            <a:endParaRPr lang="en-US" dirty="0"/>
           </a:p>
         </p:txBody>
       </p:sp>
@@ -6837,6 +6940,44 @@
           <a:bodyPr/>
           <a:lstStyle/>
           <a:p>
+            <a:r>
+              <a:rPr lang="en-US" dirty="0" smtClean="0"/>
+              <a:t>Allowed Amount – the total amount the insurance organization has contracted to pay the provider.</a:t>
+            </a:r>
+          </a:p>
+          <a:p>
+            <a:r>
+              <a:rPr lang="en-US" dirty="0" smtClean="0"/>
+              <a:t>Charge Amount – the amount the provider bills the insurance company.</a:t>
+            </a:r>
+          </a:p>
+          <a:p>
+            <a:r>
+              <a:rPr lang="en-US" dirty="0" smtClean="0"/>
+              <a:t>Paid Amount – The actual amount paid.  Can be zero for capitated claims.</a:t>
+            </a:r>
+          </a:p>
+          <a:p>
+            <a:r>
+              <a:rPr lang="en-US" dirty="0" smtClean="0"/>
+              <a:t>Copay  - The amount the member paid as a copay</a:t>
+            </a:r>
+          </a:p>
+          <a:p>
+            <a:r>
+              <a:rPr lang="en-US" dirty="0" smtClean="0"/>
+              <a:t>Coinsurance – The amount the member paid as coinsurance</a:t>
+            </a:r>
+          </a:p>
+          <a:p>
+            <a:r>
+              <a:rPr lang="en-US" dirty="0" smtClean="0"/>
+              <a:t>Deductible – The amount the member paid towards the </a:t>
+            </a:r>
+            <a:r>
+              <a:rPr lang="en-US" smtClean="0"/>
+              <a:t>policy’s deductible.</a:t>
+            </a:r>
             <a:endParaRPr lang="en-US" dirty="0"/>
           </a:p>
         </p:txBody>
@@ -7577,7 +7718,7 @@
   <a:extraClrSchemeLst/>
   <a:extLst>
     <a:ext uri="{05A4C25C-085E-4340-85A3-A5531E510DB2}">
-      <thm15:themeFamily xmlns:thm15="http://schemas.microsoft.com/office/thememl/2012/main" xmlns="" name="Gallery" id="{BBFCD31E-59A1-489D-B089-A3EAD7CAE12E}" vid="{AC464412-510E-4F2B-8947-A0DDBD028997}"/>
+      <thm15:themeFamily xmlns="" xmlns:thm15="http://schemas.microsoft.com/office/thememl/2012/main" name="Gallery" id="{BBFCD31E-59A1-489D-B089-A3EAD7CAE12E}" vid="{AC464412-510E-4F2B-8947-A0DDBD028997}"/>
     </a:ext>
   </a:extLst>
 </a:theme>

</xml_diff>

<commit_message>
finished the claims powerpoint
</commit_message>
<xml_diff>
--- a/PowerPoints/Phase 2 - Overview/002 An Overview of Medical Claims Data.pptx
+++ b/PowerPoints/Phase 2 - Overview/002 An Overview of Medical Claims Data.pptx
@@ -11,8 +11,7 @@
     <p:sldId id="258" r:id="rId5"/>
     <p:sldId id="259" r:id="rId6"/>
     <p:sldId id="260" r:id="rId7"/>
-    <p:sldId id="261" r:id="rId8"/>
-    <p:sldId id="262" r:id="rId9"/>
+    <p:sldId id="262" r:id="rId8"/>
   </p:sldIdLst>
   <p:sldSz cx="12192000" cy="6858000"/>
   <p:notesSz cx="6858000" cy="9144000"/>
@@ -256,7 +255,7 @@
           <a:p>
             <a:fld id="{FF632088-7E42-4B13-8645-6CA4616862AF}" type="datetimeFigureOut">
               <a:rPr lang="en-US" smtClean="0"/>
-              <a:t>2/29/2016</a:t>
+              <a:t>3/1/2016</a:t>
             </a:fld>
             <a:endParaRPr lang="en-US"/>
           </a:p>
@@ -426,7 +425,7 @@
           <a:p>
             <a:fld id="{FF632088-7E42-4B13-8645-6CA4616862AF}" type="datetimeFigureOut">
               <a:rPr lang="en-US" smtClean="0"/>
-              <a:t>2/29/2016</a:t>
+              <a:t>3/1/2016</a:t>
             </a:fld>
             <a:endParaRPr lang="en-US"/>
           </a:p>
@@ -606,7 +605,7 @@
           <a:p>
             <a:fld id="{FF632088-7E42-4B13-8645-6CA4616862AF}" type="datetimeFigureOut">
               <a:rPr lang="en-US" smtClean="0"/>
-              <a:t>2/29/2016</a:t>
+              <a:t>3/1/2016</a:t>
             </a:fld>
             <a:endParaRPr lang="en-US"/>
           </a:p>
@@ -806,7 +805,7 @@
           <a:p>
             <a:fld id="{FF632088-7E42-4B13-8645-6CA4616862AF}" type="datetimeFigureOut">
               <a:rPr lang="en-US" smtClean="0"/>
-              <a:t>2/29/2016</a:t>
+              <a:t>3/1/2016</a:t>
             </a:fld>
             <a:endParaRPr lang="en-US"/>
           </a:p>
@@ -1023,7 +1022,7 @@
           <a:p>
             <a:fld id="{FF632088-7E42-4B13-8645-6CA4616862AF}" type="datetimeFigureOut">
               <a:rPr lang="en-US" smtClean="0"/>
-              <a:t>2/29/2016</a:t>
+              <a:t>3/1/2016</a:t>
             </a:fld>
             <a:endParaRPr lang="en-US"/>
           </a:p>
@@ -1308,7 +1307,7 @@
           <a:p>
             <a:fld id="{FF632088-7E42-4B13-8645-6CA4616862AF}" type="datetimeFigureOut">
               <a:rPr lang="en-US" smtClean="0"/>
-              <a:t>2/29/2016</a:t>
+              <a:t>3/1/2016</a:t>
             </a:fld>
             <a:endParaRPr lang="en-US"/>
           </a:p>
@@ -1582,7 +1581,7 @@
           <a:p>
             <a:fld id="{FF632088-7E42-4B13-8645-6CA4616862AF}" type="datetimeFigureOut">
               <a:rPr lang="en-US" smtClean="0"/>
-              <a:t>2/29/2016</a:t>
+              <a:t>3/1/2016</a:t>
             </a:fld>
             <a:endParaRPr lang="en-US"/>
           </a:p>
@@ -2009,7 +2008,7 @@
           <a:p>
             <a:fld id="{FF632088-7E42-4B13-8645-6CA4616862AF}" type="datetimeFigureOut">
               <a:rPr lang="en-US" smtClean="0"/>
-              <a:t>2/29/2016</a:t>
+              <a:t>3/1/2016</a:t>
             </a:fld>
             <a:endParaRPr lang="en-US"/>
           </a:p>
@@ -2169,7 +2168,7 @@
           <a:p>
             <a:fld id="{FF632088-7E42-4B13-8645-6CA4616862AF}" type="datetimeFigureOut">
               <a:rPr lang="en-US" smtClean="0"/>
-              <a:t>2/29/2016</a:t>
+              <a:t>3/1/2016</a:t>
             </a:fld>
             <a:endParaRPr lang="en-US"/>
           </a:p>
@@ -2301,7 +2300,7 @@
           <a:p>
             <a:fld id="{FF632088-7E42-4B13-8645-6CA4616862AF}" type="datetimeFigureOut">
               <a:rPr lang="en-US" smtClean="0"/>
-              <a:t>2/29/2016</a:t>
+              <a:t>3/1/2016</a:t>
             </a:fld>
             <a:endParaRPr lang="en-US"/>
           </a:p>
@@ -2552,7 +2551,7 @@
           <a:p>
             <a:fld id="{FF632088-7E42-4B13-8645-6CA4616862AF}" type="datetimeFigureOut">
               <a:rPr lang="en-US" smtClean="0"/>
-              <a:t>2/29/2016</a:t>
+              <a:t>3/1/2016</a:t>
             </a:fld>
             <a:endParaRPr lang="en-US"/>
           </a:p>
@@ -2764,7 +2763,7 @@
           <a:p>
             <a:fld id="{FF632088-7E42-4B13-8645-6CA4616862AF}" type="datetimeFigureOut">
               <a:rPr lang="en-US" smtClean="0"/>
-              <a:t>2/29/2016</a:t>
+              <a:t>3/1/2016</a:t>
             </a:fld>
             <a:endParaRPr lang="en-US"/>
           </a:p>
@@ -3182,7 +3181,7 @@
           <a:p>
             <a:fld id="{FF632088-7E42-4B13-8645-6CA4616862AF}" type="datetimeFigureOut">
               <a:rPr lang="en-US" smtClean="0"/>
-              <a:t>2/29/2016</a:t>
+              <a:t>3/1/2016</a:t>
             </a:fld>
             <a:endParaRPr lang="en-US"/>
           </a:p>
@@ -3394,7 +3393,7 @@
           <a:p>
             <a:fld id="{FF632088-7E42-4B13-8645-6CA4616862AF}" type="datetimeFigureOut">
               <a:rPr lang="en-US" smtClean="0"/>
-              <a:t>2/29/2016</a:t>
+              <a:t>3/1/2016</a:t>
             </a:fld>
             <a:endParaRPr lang="en-US"/>
           </a:p>
@@ -3615,7 +3614,7 @@
           <a:p>
             <a:fld id="{FF632088-7E42-4B13-8645-6CA4616862AF}" type="datetimeFigureOut">
               <a:rPr lang="en-US" smtClean="0"/>
-              <a:t>2/29/2016</a:t>
+              <a:t>3/1/2016</a:t>
             </a:fld>
             <a:endParaRPr lang="en-US"/>
           </a:p>
@@ -3903,7 +3902,7 @@
           <a:p>
             <a:fld id="{FF632088-7E42-4B13-8645-6CA4616862AF}" type="datetimeFigureOut">
               <a:rPr lang="en-US" smtClean="0"/>
-              <a:t>2/29/2016</a:t>
+              <a:t>3/1/2016</a:t>
             </a:fld>
             <a:endParaRPr lang="en-US"/>
           </a:p>
@@ -4135,7 +4134,7 @@
           <a:p>
             <a:fld id="{FF632088-7E42-4B13-8645-6CA4616862AF}" type="datetimeFigureOut">
               <a:rPr lang="en-US" smtClean="0"/>
-              <a:t>2/29/2016</a:t>
+              <a:t>3/1/2016</a:t>
             </a:fld>
             <a:endParaRPr lang="en-US"/>
           </a:p>
@@ -4487,7 +4486,7 @@
           <a:p>
             <a:fld id="{FF632088-7E42-4B13-8645-6CA4616862AF}" type="datetimeFigureOut">
               <a:rPr lang="en-US" smtClean="0"/>
-              <a:t>2/29/2016</a:t>
+              <a:t>3/1/2016</a:t>
             </a:fld>
             <a:endParaRPr lang="en-US"/>
           </a:p>
@@ -4610,7 +4609,7 @@
           <a:p>
             <a:fld id="{FF632088-7E42-4B13-8645-6CA4616862AF}" type="datetimeFigureOut">
               <a:rPr lang="en-US" smtClean="0"/>
-              <a:t>2/29/2016</a:t>
+              <a:t>3/1/2016</a:t>
             </a:fld>
             <a:endParaRPr lang="en-US"/>
           </a:p>
@@ -4728,7 +4727,7 @@
           <a:p>
             <a:fld id="{FF632088-7E42-4B13-8645-6CA4616862AF}" type="datetimeFigureOut">
               <a:rPr lang="en-US" smtClean="0"/>
-              <a:t>2/29/2016</a:t>
+              <a:t>3/1/2016</a:t>
             </a:fld>
             <a:endParaRPr lang="en-US"/>
           </a:p>
@@ -5012,7 +5011,7 @@
           <a:p>
             <a:fld id="{FF632088-7E42-4B13-8645-6CA4616862AF}" type="datetimeFigureOut">
               <a:rPr lang="en-US" smtClean="0"/>
-              <a:t>2/29/2016</a:t>
+              <a:t>3/1/2016</a:t>
             </a:fld>
             <a:endParaRPr lang="en-US"/>
           </a:p>
@@ -5281,7 +5280,7 @@
           <a:p>
             <a:fld id="{FF632088-7E42-4B13-8645-6CA4616862AF}" type="datetimeFigureOut">
               <a:rPr lang="en-US" smtClean="0"/>
-              <a:t>2/29/2016</a:t>
+              <a:t>3/1/2016</a:t>
             </a:fld>
             <a:endParaRPr lang="en-US"/>
           </a:p>
@@ -5495,7 +5494,7 @@
           <a:p>
             <a:fld id="{FF632088-7E42-4B13-8645-6CA4616862AF}" type="datetimeFigureOut">
               <a:rPr lang="en-US" smtClean="0"/>
-              <a:t>2/29/2016</a:t>
+              <a:t>3/1/2016</a:t>
             </a:fld>
             <a:endParaRPr lang="en-US"/>
           </a:p>
@@ -6100,7 +6099,7 @@
           <a:p>
             <a:fld id="{FF632088-7E42-4B13-8645-6CA4616862AF}" type="datetimeFigureOut">
               <a:rPr lang="en-US" smtClean="0"/>
-              <a:t>2/29/2016</a:t>
+              <a:t>3/1/2016</a:t>
             </a:fld>
             <a:endParaRPr lang="en-US"/>
           </a:p>
@@ -6716,19 +6715,15 @@
             <a:pPr lvl="1"/>
             <a:r>
               <a:rPr lang="en-US" dirty="0" smtClean="0"/>
-              <a:t>Examples include </a:t>
+              <a:t>Examples include hospital inpatient stays, outpatient visits, doctor office </a:t>
             </a:r>
             <a:r>
               <a:rPr lang="en-US" dirty="0" smtClean="0"/>
-              <a:t>hospital inpatient stays, outpatient visits, doctor office </a:t>
-            </a:r>
-            <a:r>
-              <a:rPr lang="en-US" dirty="0" err="1" smtClean="0"/>
-              <a:t>visirt</a:t>
+              <a:t>visit, </a:t>
             </a:r>
             <a:r>
               <a:rPr lang="en-US" dirty="0" smtClean="0"/>
-              <a:t>, etc.</a:t>
+              <a:t>etc.</a:t>
             </a:r>
           </a:p>
           <a:p>
@@ -6751,7 +6746,6 @@
               <a:rPr lang="en-US" dirty="0" smtClean="0"/>
               <a:t>Fully-denied claims are excluded</a:t>
             </a:r>
-            <a:endParaRPr lang="en-US" dirty="0" smtClean="0"/>
           </a:p>
           <a:p>
             <a:r>
@@ -6861,12 +6855,8 @@
               <a:t>The APCD contains a “Highest Version” indicator field that prevents double counting by identifying the most recent version of a </a:t>
             </a:r>
             <a:r>
-              <a:rPr lang="en-US" dirty="0" err="1" smtClean="0"/>
-              <a:t>claimn</a:t>
-            </a:r>
-            <a:r>
               <a:rPr lang="en-US" dirty="0" smtClean="0"/>
-              <a:t>.</a:t>
+              <a:t>claim.</a:t>
             </a:r>
             <a:endParaRPr lang="en-US" dirty="0"/>
           </a:p>
@@ -7027,7 +7017,11 @@
           <a:bodyPr/>
           <a:lstStyle/>
           <a:p>
-            <a:endParaRPr lang="en-US"/>
+            <a:r>
+              <a:rPr lang="en-US" dirty="0" smtClean="0"/>
+              <a:t>What Medical Data is Available?</a:t>
+            </a:r>
+            <a:endParaRPr lang="en-US" dirty="0"/>
           </a:p>
         </p:txBody>
       </p:sp>
@@ -7046,6 +7040,34 @@
           <a:bodyPr/>
           <a:lstStyle/>
           <a:p>
+            <a:r>
+              <a:rPr lang="en-US" dirty="0" smtClean="0"/>
+              <a:t>ICD Codes – Diagnosis data recorded using the International Classification of Disease methodology.</a:t>
+            </a:r>
+          </a:p>
+          <a:p>
+            <a:r>
+              <a:rPr lang="en-US" dirty="0" smtClean="0"/>
+              <a:t>E-Code – Codes that identify external injuries.</a:t>
+            </a:r>
+          </a:p>
+          <a:p>
+            <a:r>
+              <a:rPr lang="en-US" dirty="0" smtClean="0"/>
+              <a:t>Revenue Codes – Describe medical goods and services utilized.</a:t>
+            </a:r>
+          </a:p>
+          <a:p>
+            <a:r>
+              <a:rPr lang="en-US" dirty="0" smtClean="0"/>
+              <a:t>Procedure Codes – Identifies the medical procedures performed.</a:t>
+            </a:r>
+          </a:p>
+          <a:p>
+            <a:r>
+              <a:rPr lang="en-US" dirty="0" smtClean="0"/>
+              <a:t>Diagnostic Related Group (DRG) Code – Classify claims into groups based on the type of service the patient received</a:t>
+            </a:r>
             <a:endParaRPr lang="en-US" dirty="0"/>
           </a:p>
         </p:txBody>
@@ -7095,74 +7117,6 @@
           <a:bodyPr/>
           <a:lstStyle/>
           <a:p>
-            <a:endParaRPr lang="en-US"/>
-          </a:p>
-        </p:txBody>
-      </p:sp>
-      <p:sp>
-        <p:nvSpPr>
-          <p:cNvPr id="3" name="Content Placeholder 2"/>
-          <p:cNvSpPr>
-            <a:spLocks noGrp="1"/>
-          </p:cNvSpPr>
-          <p:nvPr>
-            <p:ph idx="1"/>
-          </p:nvPr>
-        </p:nvSpPr>
-        <p:spPr/>
-        <p:txBody>
-          <a:bodyPr/>
-          <a:lstStyle/>
-          <a:p>
-            <a:endParaRPr lang="en-US" dirty="0"/>
-          </a:p>
-        </p:txBody>
-      </p:sp>
-    </p:spTree>
-    <p:extLst>
-      <p:ext uri="{BB962C8B-B14F-4D97-AF65-F5344CB8AC3E}">
-        <p14:creationId xmlns:p14="http://schemas.microsoft.com/office/powerpoint/2010/main" val="1861284126"/>
-      </p:ext>
-    </p:extLst>
-  </p:cSld>
-  <p:clrMapOvr>
-    <a:masterClrMapping/>
-  </p:clrMapOvr>
-</p:sld>
-</file>
-
-<file path=ppt/slides/slide7.xml><?xml version="1.0" encoding="utf-8"?>
-<p:sld xmlns:a="http://schemas.openxmlformats.org/drawingml/2006/main" xmlns:r="http://schemas.openxmlformats.org/officeDocument/2006/relationships" xmlns:p="http://schemas.openxmlformats.org/presentationml/2006/main">
-  <p:cSld>
-    <p:spTree>
-      <p:nvGrpSpPr>
-        <p:cNvPr id="1" name=""/>
-        <p:cNvGrpSpPr/>
-        <p:nvPr/>
-      </p:nvGrpSpPr>
-      <p:grpSpPr>
-        <a:xfrm>
-          <a:off x="0" y="0"/>
-          <a:ext cx="0" cy="0"/>
-          <a:chOff x="0" y="0"/>
-          <a:chExt cx="0" cy="0"/>
-        </a:xfrm>
-      </p:grpSpPr>
-      <p:sp>
-        <p:nvSpPr>
-          <p:cNvPr id="2" name="Title 1"/>
-          <p:cNvSpPr>
-            <a:spLocks noGrp="1"/>
-          </p:cNvSpPr>
-          <p:nvPr>
-            <p:ph type="title"/>
-          </p:nvPr>
-        </p:nvSpPr>
-        <p:spPr/>
-        <p:txBody>
-          <a:bodyPr/>
-          <a:lstStyle/>
-          <a:p>
             <a:r>
               <a:rPr lang="en-US" dirty="0" smtClean="0"/>
               <a:t>References</a:t>
@@ -7198,6 +7152,54 @@
               </a:rPr>
               <a:t>www.chiamass.gov/assets/docs/p/apcd/submission-guides/version-5.0/v5-apcd-medical-claim-file-submission-guide-FINAL.pdf</a:t>
             </a:r>
+            <a:endParaRPr lang="en-US" dirty="0" smtClean="0"/>
+          </a:p>
+          <a:p>
+            <a:r>
+              <a:rPr lang="en-US" dirty="0">
+                <a:hlinkClick r:id="rId3"/>
+              </a:rPr>
+              <a:t>https://</a:t>
+            </a:r>
+            <a:r>
+              <a:rPr lang="en-US" dirty="0" smtClean="0">
+                <a:hlinkClick r:id="rId3"/>
+              </a:rPr>
+              <a:t>en.wikipedia.org/wiki/Diagnosis-related_group</a:t>
+            </a:r>
+            <a:endParaRPr lang="en-US" dirty="0" smtClean="0"/>
+          </a:p>
+          <a:p>
+            <a:r>
+              <a:rPr lang="en-US" dirty="0">
+                <a:hlinkClick r:id="rId4"/>
+              </a:rPr>
+              <a:t>http://valuehealthcareservices.com/education/understanding-hospital-revenue-codes</a:t>
+            </a:r>
+            <a:r>
+              <a:rPr lang="en-US" dirty="0" smtClean="0">
+                <a:hlinkClick r:id="rId4"/>
+              </a:rPr>
+              <a:t>/</a:t>
+            </a:r>
+            <a:endParaRPr lang="en-US" dirty="0" smtClean="0"/>
+          </a:p>
+          <a:p>
+            <a:r>
+              <a:rPr lang="en-US" dirty="0">
+                <a:hlinkClick r:id="rId5"/>
+              </a:rPr>
+              <a:t>https://</a:t>
+            </a:r>
+            <a:r>
+              <a:rPr lang="en-US" dirty="0" smtClean="0">
+                <a:hlinkClick r:id="rId5"/>
+              </a:rPr>
+              <a:t>en.wikipedia.org/wiki/International_Statistical_Classification_of_Diseases_and_Related_Health_Problems</a:t>
+            </a:r>
+            <a:endParaRPr lang="en-US" dirty="0" smtClean="0"/>
+          </a:p>
+          <a:p>
             <a:endParaRPr lang="en-US" dirty="0" smtClean="0"/>
           </a:p>
           <a:p>

</xml_diff>